<commit_message>
medical panel added to week 10
</commit_message>
<xml_diff>
--- a/slides/cds431_week4_1.pptx
+++ b/slides/cds431_week4_1.pptx
@@ -5,7 +5,7 @@
     <p:sldMasterId id="2147483648" r:id="rId1"/>
   </p:sldMasterIdLst>
   <p:notesMasterIdLst>
-    <p:notesMasterId r:id="rId18"/>
+    <p:notesMasterId r:id="rId17"/>
   </p:notesMasterIdLst>
   <p:sldIdLst>
     <p:sldId id="408" r:id="rId2"/>
@@ -23,7 +23,6 @@
     <p:sldId id="535" r:id="rId14"/>
     <p:sldId id="534" r:id="rId15"/>
     <p:sldId id="536" r:id="rId16"/>
-    <p:sldId id="297" r:id="rId17"/>
   </p:sldIdLst>
   <p:sldSz cx="12192000" cy="6858000"/>
   <p:notesSz cx="6858000" cy="9144000"/>
@@ -122,6 +121,11 @@
       </a:defRPr>
     </a:lvl9pPr>
   </p:defaultTextStyle>
+  <p:extLst>
+    <p:ext uri="{EFAFB233-063F-42B5-8137-9DF3F51BA10A}">
+      <p15:sldGuideLst xmlns:p15="http://schemas.microsoft.com/office/powerpoint/2012/main"/>
+    </p:ext>
+  </p:extLst>
 </p:presentation>
 </file>
 
@@ -207,7 +211,7 @@
           <a:p>
             <a:fld id="{7BD42D89-64F2-5E44-998D-54AF6D40E4AE}" type="datetimeFigureOut">
               <a:rPr lang="en-US" smtClean="0"/>
-              <a:t>1/4/22</a:t>
+              <a:t>4/10/22</a:t>
             </a:fld>
             <a:endParaRPr lang="en-US"/>
           </a:p>
@@ -1584,7 +1588,7 @@
           <a:p>
             <a:fld id="{86ED8F93-1253-CC46-BD23-6B16D47EB250}" type="datetimeFigureOut">
               <a:rPr lang="en-US" smtClean="0"/>
-              <a:t>1/4/22</a:t>
+              <a:t>4/10/22</a:t>
             </a:fld>
             <a:endParaRPr lang="en-US"/>
           </a:p>
@@ -1782,7 +1786,7 @@
           <a:p>
             <a:fld id="{86ED8F93-1253-CC46-BD23-6B16D47EB250}" type="datetimeFigureOut">
               <a:rPr lang="en-US" smtClean="0"/>
-              <a:t>1/4/22</a:t>
+              <a:t>4/10/22</a:t>
             </a:fld>
             <a:endParaRPr lang="en-US"/>
           </a:p>
@@ -1990,7 +1994,7 @@
           <a:p>
             <a:fld id="{86ED8F93-1253-CC46-BD23-6B16D47EB250}" type="datetimeFigureOut">
               <a:rPr lang="en-US" smtClean="0"/>
-              <a:t>1/4/22</a:t>
+              <a:t>4/10/22</a:t>
             </a:fld>
             <a:endParaRPr lang="en-US"/>
           </a:p>
@@ -2188,7 +2192,7 @@
           <a:p>
             <a:fld id="{86ED8F93-1253-CC46-BD23-6B16D47EB250}" type="datetimeFigureOut">
               <a:rPr lang="en-US" smtClean="0"/>
-              <a:t>1/4/22</a:t>
+              <a:t>4/10/22</a:t>
             </a:fld>
             <a:endParaRPr lang="en-US"/>
           </a:p>
@@ -2463,7 +2467,7 @@
           <a:p>
             <a:fld id="{86ED8F93-1253-CC46-BD23-6B16D47EB250}" type="datetimeFigureOut">
               <a:rPr lang="en-US" smtClean="0"/>
-              <a:t>1/4/22</a:t>
+              <a:t>4/10/22</a:t>
             </a:fld>
             <a:endParaRPr lang="en-US"/>
           </a:p>
@@ -2728,7 +2732,7 @@
           <a:p>
             <a:fld id="{86ED8F93-1253-CC46-BD23-6B16D47EB250}" type="datetimeFigureOut">
               <a:rPr lang="en-US" smtClean="0"/>
-              <a:t>1/4/22</a:t>
+              <a:t>4/10/22</a:t>
             </a:fld>
             <a:endParaRPr lang="en-US"/>
           </a:p>
@@ -3140,7 +3144,7 @@
           <a:p>
             <a:fld id="{86ED8F93-1253-CC46-BD23-6B16D47EB250}" type="datetimeFigureOut">
               <a:rPr lang="en-US" smtClean="0"/>
-              <a:t>1/4/22</a:t>
+              <a:t>4/10/22</a:t>
             </a:fld>
             <a:endParaRPr lang="en-US"/>
           </a:p>
@@ -3281,7 +3285,7 @@
           <a:p>
             <a:fld id="{86ED8F93-1253-CC46-BD23-6B16D47EB250}" type="datetimeFigureOut">
               <a:rPr lang="en-US" smtClean="0"/>
-              <a:t>1/4/22</a:t>
+              <a:t>4/10/22</a:t>
             </a:fld>
             <a:endParaRPr lang="en-US"/>
           </a:p>
@@ -3394,7 +3398,7 @@
           <a:p>
             <a:fld id="{86ED8F93-1253-CC46-BD23-6B16D47EB250}" type="datetimeFigureOut">
               <a:rPr lang="en-US" smtClean="0"/>
-              <a:t>1/4/22</a:t>
+              <a:t>4/10/22</a:t>
             </a:fld>
             <a:endParaRPr lang="en-US"/>
           </a:p>
@@ -3705,7 +3709,7 @@
           <a:p>
             <a:fld id="{86ED8F93-1253-CC46-BD23-6B16D47EB250}" type="datetimeFigureOut">
               <a:rPr lang="en-US" smtClean="0"/>
-              <a:t>1/4/22</a:t>
+              <a:t>4/10/22</a:t>
             </a:fld>
             <a:endParaRPr lang="en-US"/>
           </a:p>
@@ -3993,7 +3997,7 @@
           <a:p>
             <a:fld id="{86ED8F93-1253-CC46-BD23-6B16D47EB250}" type="datetimeFigureOut">
               <a:rPr lang="en-US" smtClean="0"/>
-              <a:t>1/4/22</a:t>
+              <a:t>4/10/22</a:t>
             </a:fld>
             <a:endParaRPr lang="en-US"/>
           </a:p>
@@ -4264,7 +4268,7 @@
           <a:p>
             <a:fld id="{86ED8F93-1253-CC46-BD23-6B16D47EB250}" type="datetimeFigureOut">
               <a:rPr lang="en-US" smtClean="0"/>
-              <a:t>1/4/22</a:t>
+              <a:t>4/10/22</a:t>
             </a:fld>
             <a:endParaRPr lang="en-US"/>
           </a:p>
@@ -5997,173 +6001,6 @@
     <p:extLst>
       <p:ext uri="{BB962C8B-B14F-4D97-AF65-F5344CB8AC3E}">
         <p14:creationId xmlns:p14="http://schemas.microsoft.com/office/powerpoint/2010/main" val="3387037978"/>
-      </p:ext>
-    </p:extLst>
-  </p:cSld>
-  <p:clrMapOvr>
-    <a:masterClrMapping/>
-  </p:clrMapOvr>
-</p:sld>
-</file>
-
-<file path=ppt/slides/slide16.xml><?xml version="1.0" encoding="utf-8"?>
-<p:sld xmlns:a="http://schemas.openxmlformats.org/drawingml/2006/main" xmlns:r="http://schemas.openxmlformats.org/officeDocument/2006/relationships" xmlns:p="http://schemas.openxmlformats.org/presentationml/2006/main">
-  <p:cSld>
-    <p:spTree>
-      <p:nvGrpSpPr>
-        <p:cNvPr id="1" name=""/>
-        <p:cNvGrpSpPr/>
-        <p:nvPr/>
-      </p:nvGrpSpPr>
-      <p:grpSpPr>
-        <a:xfrm>
-          <a:off x="0" y="0"/>
-          <a:ext cx="0" cy="0"/>
-          <a:chOff x="0" y="0"/>
-          <a:chExt cx="0" cy="0"/>
-        </a:xfrm>
-      </p:grpSpPr>
-      <p:sp>
-        <p:nvSpPr>
-          <p:cNvPr id="2" name="Title 1"/>
-          <p:cNvSpPr>
-            <a:spLocks noGrp="1"/>
-          </p:cNvSpPr>
-          <p:nvPr>
-            <p:ph type="title"/>
-          </p:nvPr>
-        </p:nvSpPr>
-        <p:spPr/>
-        <p:txBody>
-          <a:bodyPr/>
-          <a:lstStyle/>
-          <a:p>
-            <a:pPr algn="ctr"/>
-            <a:r>
-              <a:rPr lang="en-US" dirty="0"/>
-              <a:t>Case Study:  Assignment 1 </a:t>
-            </a:r>
-          </a:p>
-        </p:txBody>
-      </p:sp>
-      <p:sp>
-        <p:nvSpPr>
-          <p:cNvPr id="3" name="Content Placeholder 2"/>
-          <p:cNvSpPr>
-            <a:spLocks noGrp="1"/>
-          </p:cNvSpPr>
-          <p:nvPr>
-            <p:ph idx="1"/>
-          </p:nvPr>
-        </p:nvSpPr>
-        <p:spPr>
-          <a:xfrm>
-            <a:off x="2152650" y="1569147"/>
-            <a:ext cx="7886700" cy="4351338"/>
-          </a:xfrm>
-        </p:spPr>
-        <p:txBody>
-          <a:bodyPr>
-            <a:normAutofit/>
-          </a:bodyPr>
-          <a:lstStyle/>
-          <a:p>
-            <a:pPr lvl="0"/>
-            <a:r>
-              <a:rPr lang="en-US" sz="2400" dirty="0"/>
-              <a:t>Jimmy is a 2-year-old who was referred to your clinic for an evaluation by his mother who is concerned that he is not talking. She explained that he:</a:t>
-            </a:r>
-          </a:p>
-          <a:p>
-            <a:pPr lvl="1"/>
-            <a:r>
-              <a:rPr lang="en-US" dirty="0"/>
-              <a:t>says only about 5 words</a:t>
-            </a:r>
-          </a:p>
-          <a:p>
-            <a:pPr lvl="1"/>
-            <a:r>
-              <a:rPr lang="en-US" dirty="0"/>
-              <a:t>doesn’t “listen” at home</a:t>
-            </a:r>
-          </a:p>
-          <a:p>
-            <a:pPr lvl="1"/>
-            <a:r>
-              <a:rPr lang="en-US" dirty="0"/>
-              <a:t>has had several ear infections</a:t>
-            </a:r>
-          </a:p>
-          <a:p>
-            <a:pPr lvl="1"/>
-            <a:r>
-              <a:rPr lang="en-US" dirty="0"/>
-              <a:t>has never received speech-language services</a:t>
-            </a:r>
-          </a:p>
-          <a:p>
-            <a:pPr lvl="1"/>
-            <a:r>
-              <a:rPr lang="en-US" dirty="0"/>
-              <a:t>lives at home with his mother, father, and big sister</a:t>
-            </a:r>
-          </a:p>
-          <a:p>
-            <a:pPr marL="342900" lvl="1" indent="0">
-              <a:buNone/>
-            </a:pPr>
-            <a:endParaRPr lang="en-US" dirty="0"/>
-          </a:p>
-        </p:txBody>
-      </p:sp>
-      <p:sp>
-        <p:nvSpPr>
-          <p:cNvPr id="4" name="TextBox 3">
-            <a:extLst>
-              <a:ext uri="{FF2B5EF4-FFF2-40B4-BE49-F238E27FC236}">
-                <a16:creationId xmlns:a16="http://schemas.microsoft.com/office/drawing/2014/main" id="{51B65C0C-C1E8-8446-B6DC-53DDC1620219}"/>
-              </a:ext>
-            </a:extLst>
-          </p:cNvPr>
-          <p:cNvSpPr txBox="1"/>
-          <p:nvPr/>
-        </p:nvSpPr>
-        <p:spPr>
-          <a:xfrm>
-            <a:off x="2873299" y="5274527"/>
-            <a:ext cx="4057201" cy="523220"/>
-          </a:xfrm>
-          <a:prstGeom prst="rect">
-            <a:avLst/>
-          </a:prstGeom>
-          <a:noFill/>
-        </p:spPr>
-        <p:txBody>
-          <a:bodyPr wrap="none" rtlCol="0">
-            <a:spAutoFit/>
-          </a:bodyPr>
-          <a:lstStyle/>
-          <a:p>
-            <a:r>
-              <a:rPr lang="en-US" sz="2800" b="1" dirty="0"/>
-              <a:t>DUE April 23</a:t>
-            </a:r>
-            <a:r>
-              <a:rPr lang="en-US" sz="2800" b="1" baseline="30000" dirty="0"/>
-              <a:t>nd</a:t>
-            </a:r>
-            <a:r>
-              <a:rPr lang="en-US" sz="2800" b="1" dirty="0"/>
-              <a:t> by 5:00 pm</a:t>
-            </a:r>
-          </a:p>
-        </p:txBody>
-      </p:sp>
-    </p:spTree>
-    <p:extLst>
-      <p:ext uri="{BB962C8B-B14F-4D97-AF65-F5344CB8AC3E}">
-        <p14:creationId xmlns:p14="http://schemas.microsoft.com/office/powerpoint/2010/main" val="1784529260"/>
       </p:ext>
     </p:extLst>
   </p:cSld>

</xml_diff>

<commit_message>
Week 4 slides updated
</commit_message>
<xml_diff>
--- a/slides/cds431_week4_1.pptx
+++ b/slides/cds431_week4_1.pptx
@@ -5,24 +5,23 @@
     <p:sldMasterId id="2147483648" r:id="rId1"/>
   </p:sldMasterIdLst>
   <p:notesMasterIdLst>
-    <p:notesMasterId r:id="rId17"/>
+    <p:notesMasterId r:id="rId16"/>
   </p:notesMasterIdLst>
   <p:sldIdLst>
     <p:sldId id="408" r:id="rId2"/>
     <p:sldId id="403" r:id="rId3"/>
-    <p:sldId id="530" r:id="rId4"/>
-    <p:sldId id="523" r:id="rId5"/>
-    <p:sldId id="529" r:id="rId6"/>
-    <p:sldId id="525" r:id="rId7"/>
-    <p:sldId id="526" r:id="rId8"/>
-    <p:sldId id="527" r:id="rId9"/>
-    <p:sldId id="528" r:id="rId10"/>
-    <p:sldId id="531" r:id="rId11"/>
-    <p:sldId id="533" r:id="rId12"/>
-    <p:sldId id="532" r:id="rId13"/>
-    <p:sldId id="535" r:id="rId14"/>
-    <p:sldId id="534" r:id="rId15"/>
-    <p:sldId id="536" r:id="rId16"/>
+    <p:sldId id="523" r:id="rId4"/>
+    <p:sldId id="529" r:id="rId5"/>
+    <p:sldId id="525" r:id="rId6"/>
+    <p:sldId id="526" r:id="rId7"/>
+    <p:sldId id="527" r:id="rId8"/>
+    <p:sldId id="528" r:id="rId9"/>
+    <p:sldId id="531" r:id="rId10"/>
+    <p:sldId id="533" r:id="rId11"/>
+    <p:sldId id="532" r:id="rId12"/>
+    <p:sldId id="535" r:id="rId13"/>
+    <p:sldId id="534" r:id="rId14"/>
+    <p:sldId id="536" r:id="rId15"/>
   </p:sldIdLst>
   <p:sldSz cx="12192000" cy="6858000"/>
   <p:notesSz cx="6858000" cy="9144000"/>
@@ -211,7 +210,7 @@
           <a:p>
             <a:fld id="{7BD42D89-64F2-5E44-998D-54AF6D40E4AE}" type="datetimeFigureOut">
               <a:rPr lang="en-US" smtClean="0"/>
-              <a:t>4/10/22</a:t>
+              <a:t>4/14/22</a:t>
             </a:fld>
             <a:endParaRPr lang="en-US"/>
           </a:p>
@@ -546,7 +545,7 @@
           <a:p>
             <a:fld id="{AA0A589D-B577-494C-AEB5-A5D4F1908003}" type="slidenum">
               <a:rPr lang="en-US" smtClean="0"/>
-              <a:t>4</a:t>
+              <a:t>3</a:t>
             </a:fld>
             <a:endParaRPr lang="en-US"/>
           </a:p>
@@ -630,7 +629,7 @@
           <a:p>
             <a:fld id="{AA0A589D-B577-494C-AEB5-A5D4F1908003}" type="slidenum">
               <a:rPr lang="en-US" smtClean="0"/>
-              <a:t>14</a:t>
+              <a:t>13</a:t>
             </a:fld>
             <a:endParaRPr lang="en-US"/>
           </a:p>
@@ -717,7 +716,7 @@
           <a:p>
             <a:fld id="{AA0A589D-B577-494C-AEB5-A5D4F1908003}" type="slidenum">
               <a:rPr lang="en-US" smtClean="0"/>
-              <a:t>15</a:t>
+              <a:t>14</a:t>
             </a:fld>
             <a:endParaRPr lang="en-US"/>
           </a:p>
@@ -804,7 +803,7 @@
           <a:p>
             <a:fld id="{AA0A589D-B577-494C-AEB5-A5D4F1908003}" type="slidenum">
               <a:rPr lang="en-US" smtClean="0"/>
-              <a:t>5</a:t>
+              <a:t>4</a:t>
             </a:fld>
             <a:endParaRPr lang="en-US"/>
           </a:p>
@@ -891,7 +890,7 @@
           <a:p>
             <a:fld id="{AA0A589D-B577-494C-AEB5-A5D4F1908003}" type="slidenum">
               <a:rPr lang="en-US" smtClean="0"/>
-              <a:t>6</a:t>
+              <a:t>5</a:t>
             </a:fld>
             <a:endParaRPr lang="en-US"/>
           </a:p>
@@ -978,7 +977,7 @@
           <a:p>
             <a:fld id="{AA0A589D-B577-494C-AEB5-A5D4F1908003}" type="slidenum">
               <a:rPr lang="en-US" smtClean="0"/>
-              <a:t>7</a:t>
+              <a:t>6</a:t>
             </a:fld>
             <a:endParaRPr lang="en-US"/>
           </a:p>
@@ -1065,7 +1064,7 @@
           <a:p>
             <a:fld id="{AA0A589D-B577-494C-AEB5-A5D4F1908003}" type="slidenum">
               <a:rPr lang="en-US" smtClean="0"/>
-              <a:t>8</a:t>
+              <a:t>7</a:t>
             </a:fld>
             <a:endParaRPr lang="en-US"/>
           </a:p>
@@ -1152,7 +1151,7 @@
           <a:p>
             <a:fld id="{AA0A589D-B577-494C-AEB5-A5D4F1908003}" type="slidenum">
               <a:rPr lang="en-US" smtClean="0"/>
-              <a:t>9</a:t>
+              <a:t>8</a:t>
             </a:fld>
             <a:endParaRPr lang="en-US"/>
           </a:p>
@@ -1251,7 +1250,7 @@
           <a:p>
             <a:fld id="{AA0A589D-B577-494C-AEB5-A5D4F1908003}" type="slidenum">
               <a:rPr lang="en-US" smtClean="0"/>
-              <a:t>10</a:t>
+              <a:t>9</a:t>
             </a:fld>
             <a:endParaRPr lang="en-US"/>
           </a:p>
@@ -1338,7 +1337,7 @@
           <a:p>
             <a:fld id="{AA0A589D-B577-494C-AEB5-A5D4F1908003}" type="slidenum">
               <a:rPr lang="en-US" smtClean="0"/>
-              <a:t>11</a:t>
+              <a:t>10</a:t>
             </a:fld>
             <a:endParaRPr lang="en-US"/>
           </a:p>
@@ -1422,7 +1421,7 @@
           <a:p>
             <a:fld id="{AA0A589D-B577-494C-AEB5-A5D4F1908003}" type="slidenum">
               <a:rPr lang="en-US" smtClean="0"/>
-              <a:t>12</a:t>
+              <a:t>11</a:t>
             </a:fld>
             <a:endParaRPr lang="en-US"/>
           </a:p>
@@ -1588,7 +1587,7 @@
           <a:p>
             <a:fld id="{86ED8F93-1253-CC46-BD23-6B16D47EB250}" type="datetimeFigureOut">
               <a:rPr lang="en-US" smtClean="0"/>
-              <a:t>4/10/22</a:t>
+              <a:t>4/14/22</a:t>
             </a:fld>
             <a:endParaRPr lang="en-US"/>
           </a:p>
@@ -1786,7 +1785,7 @@
           <a:p>
             <a:fld id="{86ED8F93-1253-CC46-BD23-6B16D47EB250}" type="datetimeFigureOut">
               <a:rPr lang="en-US" smtClean="0"/>
-              <a:t>4/10/22</a:t>
+              <a:t>4/14/22</a:t>
             </a:fld>
             <a:endParaRPr lang="en-US"/>
           </a:p>
@@ -1994,7 +1993,7 @@
           <a:p>
             <a:fld id="{86ED8F93-1253-CC46-BD23-6B16D47EB250}" type="datetimeFigureOut">
               <a:rPr lang="en-US" smtClean="0"/>
-              <a:t>4/10/22</a:t>
+              <a:t>4/14/22</a:t>
             </a:fld>
             <a:endParaRPr lang="en-US"/>
           </a:p>
@@ -2192,7 +2191,7 @@
           <a:p>
             <a:fld id="{86ED8F93-1253-CC46-BD23-6B16D47EB250}" type="datetimeFigureOut">
               <a:rPr lang="en-US" smtClean="0"/>
-              <a:t>4/10/22</a:t>
+              <a:t>4/14/22</a:t>
             </a:fld>
             <a:endParaRPr lang="en-US"/>
           </a:p>
@@ -2467,7 +2466,7 @@
           <a:p>
             <a:fld id="{86ED8F93-1253-CC46-BD23-6B16D47EB250}" type="datetimeFigureOut">
               <a:rPr lang="en-US" smtClean="0"/>
-              <a:t>4/10/22</a:t>
+              <a:t>4/14/22</a:t>
             </a:fld>
             <a:endParaRPr lang="en-US"/>
           </a:p>
@@ -2732,7 +2731,7 @@
           <a:p>
             <a:fld id="{86ED8F93-1253-CC46-BD23-6B16D47EB250}" type="datetimeFigureOut">
               <a:rPr lang="en-US" smtClean="0"/>
-              <a:t>4/10/22</a:t>
+              <a:t>4/14/22</a:t>
             </a:fld>
             <a:endParaRPr lang="en-US"/>
           </a:p>
@@ -3144,7 +3143,7 @@
           <a:p>
             <a:fld id="{86ED8F93-1253-CC46-BD23-6B16D47EB250}" type="datetimeFigureOut">
               <a:rPr lang="en-US" smtClean="0"/>
-              <a:t>4/10/22</a:t>
+              <a:t>4/14/22</a:t>
             </a:fld>
             <a:endParaRPr lang="en-US"/>
           </a:p>
@@ -3285,7 +3284,7 @@
           <a:p>
             <a:fld id="{86ED8F93-1253-CC46-BD23-6B16D47EB250}" type="datetimeFigureOut">
               <a:rPr lang="en-US" smtClean="0"/>
-              <a:t>4/10/22</a:t>
+              <a:t>4/14/22</a:t>
             </a:fld>
             <a:endParaRPr lang="en-US"/>
           </a:p>
@@ -3398,7 +3397,7 @@
           <a:p>
             <a:fld id="{86ED8F93-1253-CC46-BD23-6B16D47EB250}" type="datetimeFigureOut">
               <a:rPr lang="en-US" smtClean="0"/>
-              <a:t>4/10/22</a:t>
+              <a:t>4/14/22</a:t>
             </a:fld>
             <a:endParaRPr lang="en-US"/>
           </a:p>
@@ -3709,7 +3708,7 @@
           <a:p>
             <a:fld id="{86ED8F93-1253-CC46-BD23-6B16D47EB250}" type="datetimeFigureOut">
               <a:rPr lang="en-US" smtClean="0"/>
-              <a:t>4/10/22</a:t>
+              <a:t>4/14/22</a:t>
             </a:fld>
             <a:endParaRPr lang="en-US"/>
           </a:p>
@@ -3997,7 +3996,7 @@
           <a:p>
             <a:fld id="{86ED8F93-1253-CC46-BD23-6B16D47EB250}" type="datetimeFigureOut">
               <a:rPr lang="en-US" smtClean="0"/>
-              <a:t>4/10/22</a:t>
+              <a:t>4/14/22</a:t>
             </a:fld>
             <a:endParaRPr lang="en-US"/>
           </a:p>
@@ -4268,7 +4267,7 @@
           <a:p>
             <a:fld id="{86ED8F93-1253-CC46-BD23-6B16D47EB250}" type="datetimeFigureOut">
               <a:rPr lang="en-US" smtClean="0"/>
-              <a:t>4/10/22</a:t>
+              <a:t>4/14/22</a:t>
             </a:fld>
             <a:endParaRPr lang="en-US"/>
           </a:p>
@@ -4870,8 +4869,8 @@
         </p:nvSpPr>
         <p:spPr>
           <a:xfrm>
-            <a:off x="2007328" y="1657529"/>
-            <a:ext cx="8223351" cy="2246769"/>
+            <a:off x="2007328" y="1962329"/>
+            <a:ext cx="8223351" cy="3108543"/>
           </a:xfrm>
           <a:prstGeom prst="rect">
             <a:avLst/>
@@ -4892,7 +4891,37 @@
               <a:rPr lang="en-US" sz="2800" dirty="0">
                 <a:latin typeface="Gabriola" pitchFamily="82" charset="0"/>
               </a:rPr>
-              <a:t>Consider the family’s or client’s:</a:t>
+              <a:t>Begin the discussion of the assessment results with the </a:t>
+            </a:r>
+            <a:r>
+              <a:rPr lang="en-US" sz="2800" b="1" dirty="0">
+                <a:solidFill>
+                  <a:srgbClr val="FF0000"/>
+                </a:solidFill>
+                <a:latin typeface="Gabriola" pitchFamily="82" charset="0"/>
+              </a:rPr>
+              <a:t>positives.</a:t>
+            </a:r>
+          </a:p>
+          <a:p>
+            <a:pPr marL="457200" indent="-457200">
+              <a:buFont typeface="Arial" panose="020B0604020202020204" pitchFamily="34" charset="0"/>
+              <a:buChar char="•"/>
+            </a:pPr>
+            <a:endParaRPr lang="en-US" sz="2800" dirty="0">
+              <a:latin typeface="Gabriola" pitchFamily="82" charset="0"/>
+            </a:endParaRPr>
+          </a:p>
+          <a:p>
+            <a:pPr marL="457200" indent="-457200">
+              <a:buFont typeface="Arial" panose="020B0604020202020204" pitchFamily="34" charset="0"/>
+              <a:buChar char="•"/>
+            </a:pPr>
+            <a:r>
+              <a:rPr lang="en-US" sz="2800" dirty="0">
+                <a:latin typeface="Gabriola" pitchFamily="82" charset="0"/>
+              </a:rPr>
+              <a:t>Frame assessment results in the context of :</a:t>
             </a:r>
           </a:p>
           <a:p>
@@ -4904,7 +4933,7 @@
               <a:rPr lang="en-US" sz="2800" dirty="0">
                 <a:latin typeface="Gabriola" pitchFamily="82" charset="0"/>
               </a:rPr>
-              <a:t>reason for seeking an assessment</a:t>
+              <a:t>the family’s or client’s initial questions</a:t>
             </a:r>
           </a:p>
           <a:p>
@@ -4916,113 +4945,29 @@
               <a:rPr lang="en-US" sz="2800" dirty="0">
                 <a:latin typeface="Gabriola" pitchFamily="82" charset="0"/>
               </a:rPr>
-              <a:t>current situation in life</a:t>
-            </a:r>
-          </a:p>
-          <a:p>
-            <a:pPr marL="914400" lvl="1" indent="-457200">
+              <a:t>information provided by the family or client.</a:t>
+            </a:r>
+          </a:p>
+          <a:p>
+            <a:pPr marL="457200" indent="-457200">
               <a:buFont typeface="Arial" panose="020B0604020202020204" pitchFamily="34" charset="0"/>
               <a:buChar char="•"/>
             </a:pPr>
-            <a:r>
-              <a:rPr lang="en-US" sz="2800" dirty="0">
-                <a:latin typeface="Gabriola" pitchFamily="82" charset="0"/>
-              </a:rPr>
-              <a:t>parenting philosophy/skills and/or stage of  life &amp; personal goals</a:t>
-            </a:r>
-          </a:p>
-          <a:p>
-            <a:pPr marL="914400" lvl="1" indent="-457200">
-              <a:buFont typeface="Arial" panose="020B0604020202020204" pitchFamily="34" charset="0"/>
-              <a:buChar char="•"/>
-            </a:pPr>
-            <a:r>
-              <a:rPr lang="en-US" sz="2800" dirty="0">
-                <a:latin typeface="Gabriola" pitchFamily="82" charset="0"/>
-              </a:rPr>
-              <a:t>understanding of the possible </a:t>
-            </a:r>
-            <a:r>
-              <a:rPr lang="en-US" sz="2800" b="1" dirty="0">
-                <a:latin typeface="Gabriola" pitchFamily="82" charset="0"/>
-              </a:rPr>
-              <a:t>diagnosis.</a:t>
-            </a:r>
-          </a:p>
-        </p:txBody>
-      </p:sp>
-      <p:sp>
-        <p:nvSpPr>
-          <p:cNvPr id="5" name="TextBox 4">
-            <a:extLst>
-              <a:ext uri="{FF2B5EF4-FFF2-40B4-BE49-F238E27FC236}">
-                <a16:creationId xmlns:a16="http://schemas.microsoft.com/office/drawing/2014/main" id="{F76BF309-EFB0-3044-9438-9BF9BF55578B}"/>
-              </a:ext>
-            </a:extLst>
-          </p:cNvPr>
-          <p:cNvSpPr txBox="1"/>
-          <p:nvPr/>
-        </p:nvSpPr>
-        <p:spPr>
-          <a:xfrm>
-            <a:off x="2007327" y="4088964"/>
-            <a:ext cx="7825786" cy="2554545"/>
-          </a:xfrm>
-          <a:prstGeom prst="rect">
-            <a:avLst/>
-          </a:prstGeom>
-          <a:noFill/>
-        </p:spPr>
-        <p:txBody>
-          <a:bodyPr wrap="square" rtlCol="0">
-            <a:spAutoFit/>
-          </a:bodyPr>
-          <a:lstStyle/>
-          <a:p>
-            <a:r>
-              <a:rPr lang="en-US" sz="2000" dirty="0"/>
-              <a:t>From </a:t>
-            </a:r>
-            <a:r>
-              <a:rPr lang="en-US" sz="2000" i="1" dirty="0"/>
-              <a:t>Autism in Heels </a:t>
-            </a:r>
-            <a:r>
-              <a:rPr lang="en-US" sz="2000" dirty="0"/>
-              <a:t>(2018)  a memoir by Jennifer Cook O’Toole</a:t>
-            </a:r>
-          </a:p>
-          <a:p>
-            <a:endParaRPr lang="en-US" sz="2000" dirty="0"/>
-          </a:p>
-          <a:p>
-            <a:r>
-              <a:rPr lang="en-US" sz="2000" dirty="0"/>
-              <a:t>“After all, no matter what follows, the very word </a:t>
-            </a:r>
-            <a:r>
-              <a:rPr lang="en-US" sz="2000" i="1" dirty="0"/>
-              <a:t>diagnosis </a:t>
-            </a:r>
-            <a:r>
-              <a:rPr lang="en-US" sz="2000" dirty="0"/>
-              <a:t>is scary.  No one diagnoses happiness.  You don’t go to a doctor to joyously find out whether you will be diagnosed with pregnancy.  On the contrary, diagnosis goes hand in hand with life’s deepest hurts.  Diagnosis is what I heard before the words </a:t>
-            </a:r>
-            <a:r>
-              <a:rPr lang="en-US" sz="2000" i="1" dirty="0"/>
-              <a:t>terminal lung cancer </a:t>
-            </a:r>
-            <a:r>
-              <a:rPr lang="en-US" sz="2000" dirty="0"/>
-              <a:t> and my dad’s name were mentioned in the same sentence.</a:t>
-            </a:r>
+            <a:endParaRPr lang="en-US" sz="2800" dirty="0">
+              <a:latin typeface="Gabriola" pitchFamily="82" charset="0"/>
+            </a:endParaRPr>
+          </a:p>
+          <a:p>
+            <a:endParaRPr lang="en-US" sz="2800" dirty="0">
+              <a:latin typeface="Gabriola" pitchFamily="82" charset="0"/>
+            </a:endParaRPr>
           </a:p>
         </p:txBody>
       </p:sp>
     </p:spTree>
     <p:extLst>
       <p:ext uri="{BB962C8B-B14F-4D97-AF65-F5344CB8AC3E}">
-        <p14:creationId xmlns:p14="http://schemas.microsoft.com/office/powerpoint/2010/main" val="2301073165"/>
+        <p14:creationId xmlns:p14="http://schemas.microsoft.com/office/powerpoint/2010/main" val="567842529"/>
       </p:ext>
     </p:extLst>
   </p:cSld>
@@ -5109,8 +5054,8 @@
         </p:nvSpPr>
         <p:spPr>
           <a:xfrm>
-            <a:off x="2007328" y="1962329"/>
-            <a:ext cx="8223351" cy="3108543"/>
+            <a:off x="2007328" y="1657528"/>
+            <a:ext cx="8223351" cy="2677656"/>
           </a:xfrm>
           <a:prstGeom prst="rect">
             <a:avLst/>
@@ -5131,28 +5076,7 @@
               <a:rPr lang="en-US" sz="2800" dirty="0">
                 <a:latin typeface="Gabriola" pitchFamily="82" charset="0"/>
               </a:rPr>
-              <a:t>Begin the discussion of the assessment results with the positives.</a:t>
-            </a:r>
-          </a:p>
-          <a:p>
-            <a:pPr marL="457200" indent="-457200">
-              <a:buFont typeface="Arial" panose="020B0604020202020204" pitchFamily="34" charset="0"/>
-              <a:buChar char="•"/>
-            </a:pPr>
-            <a:endParaRPr lang="en-US" sz="2800" dirty="0">
-              <a:latin typeface="Gabriola" pitchFamily="82" charset="0"/>
-            </a:endParaRPr>
-          </a:p>
-          <a:p>
-            <a:pPr marL="457200" indent="-457200">
-              <a:buFont typeface="Arial" panose="020B0604020202020204" pitchFamily="34" charset="0"/>
-              <a:buChar char="•"/>
-            </a:pPr>
-            <a:r>
-              <a:rPr lang="en-US" sz="2800" dirty="0">
-                <a:latin typeface="Gabriola" pitchFamily="82" charset="0"/>
-              </a:rPr>
-              <a:t>Frame assessment results in the context of :</a:t>
+              <a:t>Consider your words and terminology thoughtfully</a:t>
             </a:r>
           </a:p>
           <a:p>
@@ -5164,7 +5088,19 @@
               <a:rPr lang="en-US" sz="2800" dirty="0">
                 <a:latin typeface="Gabriola" pitchFamily="82" charset="0"/>
               </a:rPr>
-              <a:t>the family’s or client’s initial questions</a:t>
+              <a:t>Consider the family’s or client’s familiarity with assessment language</a:t>
+            </a:r>
+          </a:p>
+          <a:p>
+            <a:pPr marL="1371600" lvl="2" indent="-457200">
+              <a:buFont typeface="Arial" panose="020B0604020202020204" pitchFamily="34" charset="0"/>
+              <a:buChar char="•"/>
+            </a:pPr>
+            <a:r>
+              <a:rPr lang="en-US" sz="2800" dirty="0">
+                <a:latin typeface="Gabriola" pitchFamily="82" charset="0"/>
+              </a:rPr>
+              <a:t>Avoid speaking down or talking above</a:t>
             </a:r>
           </a:p>
           <a:p>
@@ -5176,29 +5112,79 @@
               <a:rPr lang="en-US" sz="2800" dirty="0">
                 <a:latin typeface="Gabriola" pitchFamily="82" charset="0"/>
               </a:rPr>
-              <a:t>information provided by the family or client.</a:t>
-            </a:r>
-          </a:p>
-          <a:p>
-            <a:pPr marL="457200" indent="-457200">
+              <a:t>Refrain from professional jargon</a:t>
+            </a:r>
+          </a:p>
+          <a:p>
+            <a:pPr marL="914400" lvl="1" indent="-457200">
               <a:buFont typeface="Arial" panose="020B0604020202020204" pitchFamily="34" charset="0"/>
               <a:buChar char="•"/>
             </a:pPr>
-            <a:endParaRPr lang="en-US" sz="2800" dirty="0">
-              <a:latin typeface="Gabriola" pitchFamily="82" charset="0"/>
-            </a:endParaRPr>
-          </a:p>
-          <a:p>
-            <a:endParaRPr lang="en-US" sz="2800" dirty="0">
-              <a:latin typeface="Gabriola" pitchFamily="82" charset="0"/>
-            </a:endParaRPr>
+            <a:r>
+              <a:rPr lang="en-US" sz="2800" dirty="0">
+                <a:latin typeface="Gabriola" pitchFamily="82" charset="0"/>
+              </a:rPr>
+              <a:t>Always define any acronyms (ASD, ADHD, SLD, ADD, CAP)</a:t>
+            </a:r>
+          </a:p>
+        </p:txBody>
+      </p:sp>
+      <p:sp>
+        <p:nvSpPr>
+          <p:cNvPr id="3" name="TextBox 2">
+            <a:extLst>
+              <a:ext uri="{FF2B5EF4-FFF2-40B4-BE49-F238E27FC236}">
+                <a16:creationId xmlns:a16="http://schemas.microsoft.com/office/drawing/2014/main" id="{5F7AE95E-9D5D-BF43-A542-8D1AEC0F7CEC}"/>
+              </a:ext>
+            </a:extLst>
+          </p:cNvPr>
+          <p:cNvSpPr txBox="1"/>
+          <p:nvPr/>
+        </p:nvSpPr>
+        <p:spPr>
+          <a:xfrm>
+            <a:off x="2007328" y="4335185"/>
+            <a:ext cx="8309113" cy="1877437"/>
+          </a:xfrm>
+          <a:prstGeom prst="rect">
+            <a:avLst/>
+          </a:prstGeom>
+          <a:noFill/>
+        </p:spPr>
+        <p:txBody>
+          <a:bodyPr wrap="square" rtlCol="0">
+            <a:spAutoFit/>
+          </a:bodyPr>
+          <a:lstStyle/>
+          <a:p>
+            <a:r>
+              <a:rPr lang="en-US" dirty="0"/>
+              <a:t>From </a:t>
+            </a:r>
+            <a:r>
+              <a:rPr lang="en-US" i="1" dirty="0"/>
+              <a:t>Autism in Heels </a:t>
+            </a:r>
+            <a:r>
+              <a:rPr lang="en-US" dirty="0"/>
+              <a:t>(2018)  a memoir by Jennifer Cook O’Toole</a:t>
+            </a:r>
+          </a:p>
+          <a:p>
+            <a:endParaRPr lang="en-US" dirty="0"/>
+          </a:p>
+          <a:p>
+            <a:r>
+              <a:rPr lang="en-US" sz="2000" dirty="0"/>
+              <a:t>“I reacted to my children’s diagnoses like a scholar.  If I was going to be able to empower and embolden them, I’d simply learn everything I could about Asperger’s, Autism, ADD and ADHD and a plethora of other acronyms that ran together like a perverse alphabet soup.”</a:t>
+            </a:r>
           </a:p>
         </p:txBody>
       </p:sp>
     </p:spTree>
     <p:extLst>
       <p:ext uri="{BB962C8B-B14F-4D97-AF65-F5344CB8AC3E}">
-        <p14:creationId xmlns:p14="http://schemas.microsoft.com/office/powerpoint/2010/main" val="567842529"/>
+        <p14:creationId xmlns:p14="http://schemas.microsoft.com/office/powerpoint/2010/main" val="4026821677"/>
       </p:ext>
     </p:extLst>
   </p:cSld>
@@ -5285,8 +5271,8 @@
         </p:nvSpPr>
         <p:spPr>
           <a:xfrm>
-            <a:off x="2007328" y="1657528"/>
-            <a:ext cx="8223351" cy="2677656"/>
+            <a:off x="2007328" y="1657529"/>
+            <a:ext cx="8223351" cy="1384995"/>
           </a:xfrm>
           <a:prstGeom prst="rect">
             <a:avLst/>
@@ -5319,19 +5305,7 @@
               <a:rPr lang="en-US" sz="2800" dirty="0">
                 <a:latin typeface="Gabriola" pitchFamily="82" charset="0"/>
               </a:rPr>
-              <a:t>Consider the family’s or client’s familiarity with assessment language</a:t>
-            </a:r>
-          </a:p>
-          <a:p>
-            <a:pPr marL="1371600" lvl="2" indent="-457200">
-              <a:buFont typeface="Arial" panose="020B0604020202020204" pitchFamily="34" charset="0"/>
-              <a:buChar char="•"/>
-            </a:pPr>
-            <a:r>
-              <a:rPr lang="en-US" sz="2800" dirty="0">
-                <a:latin typeface="Gabriola" pitchFamily="82" charset="0"/>
-              </a:rPr>
-              <a:t>Avoid speaking down or talking above</a:t>
+              <a:t>If reporting standardized scores, clearly explain</a:t>
             </a:r>
           </a:p>
           <a:p>
@@ -5343,29 +5317,17 @@
               <a:rPr lang="en-US" sz="2800" dirty="0">
                 <a:latin typeface="Gabriola" pitchFamily="82" charset="0"/>
               </a:rPr>
-              <a:t>Refrain from professional jargon</a:t>
-            </a:r>
-          </a:p>
-          <a:p>
-            <a:pPr marL="914400" lvl="1" indent="-457200">
-              <a:buFont typeface="Arial" panose="020B0604020202020204" pitchFamily="34" charset="0"/>
-              <a:buChar char="•"/>
-            </a:pPr>
-            <a:r>
-              <a:rPr lang="en-US" sz="2800" dirty="0">
-                <a:latin typeface="Gabriola" pitchFamily="82" charset="0"/>
-              </a:rPr>
-              <a:t>Always define any acronyms (ASD, ADHD, SLD, ADD, CAP)</a:t>
-            </a:r>
-          </a:p>
-        </p:txBody>
-      </p:sp>
-      <p:sp>
-        <p:nvSpPr>
-          <p:cNvPr id="3" name="TextBox 2">
+              <a:t>Avoid using judgmental terms:  great, bright, slow, uncooperative</a:t>
+            </a:r>
+          </a:p>
+        </p:txBody>
+      </p:sp>
+      <p:sp>
+        <p:nvSpPr>
+          <p:cNvPr id="6" name="TextBox 5">
             <a:extLst>
               <a:ext uri="{FF2B5EF4-FFF2-40B4-BE49-F238E27FC236}">
-                <a16:creationId xmlns:a16="http://schemas.microsoft.com/office/drawing/2014/main" id="{5F7AE95E-9D5D-BF43-A542-8D1AEC0F7CEC}"/>
+                <a16:creationId xmlns:a16="http://schemas.microsoft.com/office/drawing/2014/main" id="{F7E9D97A-9398-6B47-BF2F-5BE317D43FCA}"/>
               </a:ext>
             </a:extLst>
           </p:cNvPr>
@@ -5374,8 +5336,8 @@
         </p:nvSpPr>
         <p:spPr>
           <a:xfrm>
-            <a:off x="2007328" y="4335185"/>
-            <a:ext cx="8309113" cy="1877437"/>
+            <a:off x="1866851" y="3407532"/>
+            <a:ext cx="8309113" cy="2123658"/>
           </a:xfrm>
           <a:prstGeom prst="rect">
             <a:avLst/>
@@ -5406,8 +5368,24 @@
           </a:p>
           <a:p>
             <a:r>
-              <a:rPr lang="en-US" sz="2000" dirty="0"/>
-              <a:t>“I reacted to my children’s diagnoses like a scholar.  If I was going to be able to empower and embolden them, I’d simply learn everything I could about Asperger’s, Autism, ADD and ADHD and a plethora of other acronyms that ran together like a perverse alphabet soup.”</a:t>
+              <a:rPr lang="en-US" sz="2400" dirty="0"/>
+              <a:t>“Typical and normal were not synonyms, and I knew it firsthand.  While I would never be typical compared with 99.9 percent of folks, for me and the rest of the 0.1 percent on the edges, I was and always will be normal.  </a:t>
+            </a:r>
+            <a:r>
+              <a:rPr lang="en-US" sz="2400" i="1" dirty="0"/>
+              <a:t>My </a:t>
+            </a:r>
+            <a:r>
+              <a:rPr lang="en-US" sz="2400" dirty="0"/>
+              <a:t>normal.  </a:t>
+            </a:r>
+            <a:r>
+              <a:rPr lang="en-US" sz="2400" i="1" dirty="0"/>
+              <a:t>Our </a:t>
+            </a:r>
+            <a:r>
+              <a:rPr lang="en-US" sz="2400" dirty="0"/>
+              <a:t>normal.”</a:t>
             </a:r>
           </a:p>
         </p:txBody>
@@ -5415,7 +5393,7 @@
     </p:spTree>
     <p:extLst>
       <p:ext uri="{BB962C8B-B14F-4D97-AF65-F5344CB8AC3E}">
-        <p14:creationId xmlns:p14="http://schemas.microsoft.com/office/powerpoint/2010/main" val="4026821677"/>
+        <p14:creationId xmlns:p14="http://schemas.microsoft.com/office/powerpoint/2010/main" val="2560219139"/>
       </p:ext>
     </p:extLst>
   </p:cSld>
@@ -5503,215 +5481,6 @@
         <p:spPr>
           <a:xfrm>
             <a:off x="2007328" y="1657529"/>
-            <a:ext cx="8223351" cy="1384995"/>
-          </a:xfrm>
-          <a:prstGeom prst="rect">
-            <a:avLst/>
-          </a:prstGeom>
-          <a:noFill/>
-        </p:spPr>
-        <p:txBody>
-          <a:bodyPr wrap="square" rtlCol="0">
-            <a:spAutoFit/>
-          </a:bodyPr>
-          <a:lstStyle/>
-          <a:p>
-            <a:pPr marL="457200" indent="-457200">
-              <a:buFont typeface="Arial" panose="020B0604020202020204" pitchFamily="34" charset="0"/>
-              <a:buChar char="•"/>
-            </a:pPr>
-            <a:r>
-              <a:rPr lang="en-US" sz="2800" dirty="0">
-                <a:latin typeface="Gabriola" pitchFamily="82" charset="0"/>
-              </a:rPr>
-              <a:t>Consider your words and terminology thoughtfully</a:t>
-            </a:r>
-          </a:p>
-          <a:p>
-            <a:pPr marL="914400" lvl="1" indent="-457200">
-              <a:buFont typeface="Arial" panose="020B0604020202020204" pitchFamily="34" charset="0"/>
-              <a:buChar char="•"/>
-            </a:pPr>
-            <a:r>
-              <a:rPr lang="en-US" sz="2800" dirty="0">
-                <a:latin typeface="Gabriola" pitchFamily="82" charset="0"/>
-              </a:rPr>
-              <a:t>If reporting standardized scores, clearly explain</a:t>
-            </a:r>
-          </a:p>
-          <a:p>
-            <a:pPr marL="914400" lvl="1" indent="-457200">
-              <a:buFont typeface="Arial" panose="020B0604020202020204" pitchFamily="34" charset="0"/>
-              <a:buChar char="•"/>
-            </a:pPr>
-            <a:r>
-              <a:rPr lang="en-US" sz="2800" dirty="0">
-                <a:latin typeface="Gabriola" pitchFamily="82" charset="0"/>
-              </a:rPr>
-              <a:t>Avoid using judgmental terms:  great, bright, slow, uncooperative</a:t>
-            </a:r>
-          </a:p>
-        </p:txBody>
-      </p:sp>
-      <p:sp>
-        <p:nvSpPr>
-          <p:cNvPr id="6" name="TextBox 5">
-            <a:extLst>
-              <a:ext uri="{FF2B5EF4-FFF2-40B4-BE49-F238E27FC236}">
-                <a16:creationId xmlns:a16="http://schemas.microsoft.com/office/drawing/2014/main" id="{F7E9D97A-9398-6B47-BF2F-5BE317D43FCA}"/>
-              </a:ext>
-            </a:extLst>
-          </p:cNvPr>
-          <p:cNvSpPr txBox="1"/>
-          <p:nvPr/>
-        </p:nvSpPr>
-        <p:spPr>
-          <a:xfrm>
-            <a:off x="1866851" y="3407532"/>
-            <a:ext cx="8309113" cy="2123658"/>
-          </a:xfrm>
-          <a:prstGeom prst="rect">
-            <a:avLst/>
-          </a:prstGeom>
-          <a:noFill/>
-        </p:spPr>
-        <p:txBody>
-          <a:bodyPr wrap="square" rtlCol="0">
-            <a:spAutoFit/>
-          </a:bodyPr>
-          <a:lstStyle/>
-          <a:p>
-            <a:r>
-              <a:rPr lang="en-US" dirty="0"/>
-              <a:t>From </a:t>
-            </a:r>
-            <a:r>
-              <a:rPr lang="en-US" i="1" dirty="0"/>
-              <a:t>Autism in Heels </a:t>
-            </a:r>
-            <a:r>
-              <a:rPr lang="en-US" dirty="0"/>
-              <a:t>(2018)  a memoir by Jennifer Cook O’Toole</a:t>
-            </a:r>
-          </a:p>
-          <a:p>
-            <a:endParaRPr lang="en-US" dirty="0"/>
-          </a:p>
-          <a:p>
-            <a:r>
-              <a:rPr lang="en-US" sz="2400" dirty="0"/>
-              <a:t>“Typical and normal were not synonyms, and I knew it firsthand.  While I would never be typical compared with 99.9 percent of folks, for me and the rest of the 0.1 percent on the edges, I was and always will be normal.  </a:t>
-            </a:r>
-            <a:r>
-              <a:rPr lang="en-US" sz="2400" i="1" dirty="0"/>
-              <a:t>My </a:t>
-            </a:r>
-            <a:r>
-              <a:rPr lang="en-US" sz="2400" dirty="0"/>
-              <a:t>normal.  </a:t>
-            </a:r>
-            <a:r>
-              <a:rPr lang="en-US" sz="2400" i="1" dirty="0"/>
-              <a:t>Our </a:t>
-            </a:r>
-            <a:r>
-              <a:rPr lang="en-US" sz="2400" dirty="0"/>
-              <a:t>normal.”</a:t>
-            </a:r>
-          </a:p>
-        </p:txBody>
-      </p:sp>
-    </p:spTree>
-    <p:extLst>
-      <p:ext uri="{BB962C8B-B14F-4D97-AF65-F5344CB8AC3E}">
-        <p14:creationId xmlns:p14="http://schemas.microsoft.com/office/powerpoint/2010/main" val="2560219139"/>
-      </p:ext>
-    </p:extLst>
-  </p:cSld>
-  <p:clrMapOvr>
-    <a:masterClrMapping/>
-  </p:clrMapOvr>
-</p:sld>
-</file>
-
-<file path=ppt/slides/slide14.xml><?xml version="1.0" encoding="utf-8"?>
-<p:sld xmlns:a="http://schemas.openxmlformats.org/drawingml/2006/main" xmlns:r="http://schemas.openxmlformats.org/officeDocument/2006/relationships" xmlns:p="http://schemas.openxmlformats.org/presentationml/2006/main">
-  <p:cSld>
-    <p:spTree>
-      <p:nvGrpSpPr>
-        <p:cNvPr id="1" name=""/>
-        <p:cNvGrpSpPr/>
-        <p:nvPr/>
-      </p:nvGrpSpPr>
-      <p:grpSpPr>
-        <a:xfrm>
-          <a:off x="0" y="0"/>
-          <a:ext cx="0" cy="0"/>
-          <a:chOff x="0" y="0"/>
-          <a:chExt cx="0" cy="0"/>
-        </a:xfrm>
-      </p:grpSpPr>
-      <p:sp>
-        <p:nvSpPr>
-          <p:cNvPr id="2" name="TextBox 1">
-            <a:extLst>
-              <a:ext uri="{FF2B5EF4-FFF2-40B4-BE49-F238E27FC236}">
-                <a16:creationId xmlns:a16="http://schemas.microsoft.com/office/drawing/2014/main" id="{C2297DF4-7BF5-DD47-9935-E35747C8F551}"/>
-              </a:ext>
-            </a:extLst>
-          </p:cNvPr>
-          <p:cNvSpPr txBox="1"/>
-          <p:nvPr/>
-        </p:nvSpPr>
-        <p:spPr>
-          <a:xfrm>
-            <a:off x="2007327" y="457200"/>
-            <a:ext cx="8028160" cy="1200329"/>
-          </a:xfrm>
-          <a:prstGeom prst="rect">
-            <a:avLst/>
-          </a:prstGeom>
-          <a:noFill/>
-        </p:spPr>
-        <p:txBody>
-          <a:bodyPr wrap="none" rtlCol="0">
-            <a:spAutoFit/>
-          </a:bodyPr>
-          <a:lstStyle/>
-          <a:p>
-            <a:r>
-              <a:rPr lang="en-US" sz="3600" b="1" spc="300" dirty="0">
-                <a:latin typeface="Gabriola" pitchFamily="82" charset="0"/>
-              </a:rPr>
-              <a:t>Interpreting Results to Families and Clients</a:t>
-            </a:r>
-          </a:p>
-          <a:p>
-            <a:pPr algn="ctr"/>
-            <a:r>
-              <a:rPr lang="en-US" sz="3600" b="1" spc="300" dirty="0">
-                <a:latin typeface="Gabriola" pitchFamily="82" charset="0"/>
-              </a:rPr>
-              <a:t>Speaking with Empathy</a:t>
-            </a:r>
-          </a:p>
-        </p:txBody>
-      </p:sp>
-      <p:sp>
-        <p:nvSpPr>
-          <p:cNvPr id="4" name="TextBox 3">
-            <a:extLst>
-              <a:ext uri="{FF2B5EF4-FFF2-40B4-BE49-F238E27FC236}">
-                <a16:creationId xmlns:a16="http://schemas.microsoft.com/office/drawing/2014/main" id="{FBE7F8A3-525F-AF49-A4F4-2309B85AE35E}"/>
-              </a:ext>
-            </a:extLst>
-          </p:cNvPr>
-          <p:cNvSpPr txBox="1"/>
-          <p:nvPr/>
-        </p:nvSpPr>
-        <p:spPr>
-          <a:xfrm>
-            <a:off x="2007328" y="1657529"/>
             <a:ext cx="8223351" cy="4401205"/>
           </a:xfrm>
           <a:prstGeom prst="rect">
@@ -5829,7 +5598,7 @@
 </p:sld>
 </file>
 
-<file path=ppt/slides/slide15.xml><?xml version="1.0" encoding="utf-8"?>
+<file path=ppt/slides/slide14.xml><?xml version="1.0" encoding="utf-8"?>
 <p:sld xmlns:a="http://schemas.openxmlformats.org/drawingml/2006/main" xmlns:r="http://schemas.openxmlformats.org/officeDocument/2006/relationships" xmlns:p="http://schemas.openxmlformats.org/presentationml/2006/main">
   <p:cSld>
     <p:spTree>
@@ -6117,6 +5886,20 @@
             </a:r>
           </a:p>
           <a:p>
+            <a:pPr lvl="1"/>
+            <a:r>
+              <a:rPr lang="en-US" sz="2000" dirty="0"/>
+              <a:t>Important to be consistent in reporting and presenting sound substitution patterns</a:t>
+            </a:r>
+          </a:p>
+          <a:p>
+            <a:pPr lvl="2"/>
+            <a:r>
+              <a:rPr lang="en-US" sz="1600" dirty="0"/>
+              <a:t>e.g., descriptions of patterns (/g/ for /d/)</a:t>
+            </a:r>
+          </a:p>
+          <a:p>
             <a:endParaRPr lang="en-US" dirty="0"/>
           </a:p>
         </p:txBody>
@@ -6156,7 +5939,7 @@
           <p:cNvPr id="2" name="Title 1">
             <a:extLst>
               <a:ext uri="{FF2B5EF4-FFF2-40B4-BE49-F238E27FC236}">
-                <a16:creationId xmlns:a16="http://schemas.microsoft.com/office/drawing/2014/main" id="{11FC2D96-D598-C14B-8809-14B1AD49AD3E}"/>
+                <a16:creationId xmlns:a16="http://schemas.microsoft.com/office/drawing/2014/main" id="{BEACB89E-6F4F-4E40-8183-5CB4DA7D4021}"/>
               </a:ext>
             </a:extLst>
           </p:cNvPr>
@@ -6169,8 +5952,8 @@
         </p:nvSpPr>
         <p:spPr>
           <a:xfrm>
-            <a:off x="2152650" y="365127"/>
-            <a:ext cx="7886700" cy="1084533"/>
+            <a:off x="2198948" y="203082"/>
+            <a:ext cx="7886700" cy="893658"/>
           </a:xfrm>
         </p:spPr>
         <p:txBody>
@@ -6180,200 +5963,69 @@
             <a:pPr algn="ctr"/>
             <a:r>
               <a:rPr lang="en-US" dirty="0"/>
-              <a:t>Edit this description</a:t>
-            </a:r>
-          </a:p>
-        </p:txBody>
-      </p:sp>
-      <p:sp>
-        <p:nvSpPr>
-          <p:cNvPr id="6" name="TextBox 5">
+              <a:t>Describing Test Scores in Reports</a:t>
+            </a:r>
+          </a:p>
+        </p:txBody>
+      </p:sp>
+      <p:sp>
+        <p:nvSpPr>
+          <p:cNvPr id="3" name="Content Placeholder 2">
             <a:extLst>
               <a:ext uri="{FF2B5EF4-FFF2-40B4-BE49-F238E27FC236}">
-                <a16:creationId xmlns:a16="http://schemas.microsoft.com/office/drawing/2014/main" id="{99F6B227-E8EE-5043-8AF9-8969ECCA8929}"/>
+                <a16:creationId xmlns:a16="http://schemas.microsoft.com/office/drawing/2014/main" id="{9D1FBA8D-09E9-F04B-8EC3-6B83590F1E66}"/>
               </a:ext>
             </a:extLst>
           </p:cNvPr>
-          <p:cNvSpPr txBox="1"/>
-          <p:nvPr/>
+          <p:cNvSpPr>
+            <a:spLocks noGrp="1"/>
+          </p:cNvSpPr>
+          <p:nvPr>
+            <p:ph idx="1"/>
+          </p:nvPr>
         </p:nvSpPr>
         <p:spPr>
           <a:xfrm>
-            <a:off x="1857082" y="1206538"/>
-            <a:ext cx="7694342" cy="4893647"/>
+            <a:off x="1720770" y="992567"/>
+            <a:ext cx="8843057" cy="5462649"/>
           </a:xfrm>
-          <a:prstGeom prst="rect">
-            <a:avLst/>
-          </a:prstGeom>
-          <a:noFill/>
         </p:spPr>
         <p:txBody>
-          <a:bodyPr wrap="square" rtlCol="0">
-            <a:spAutoFit/>
+          <a:bodyPr>
+            <a:normAutofit fontScale="92500"/>
           </a:bodyPr>
           <a:lstStyle/>
           <a:p>
-            <a:r>
-              <a:rPr lang="en-US" sz="2400" u="sng" dirty="0"/>
-              <a:t>Fronting</a:t>
-            </a:r>
+            <a:pPr marL="0" indent="0">
+              <a:lnSpc>
+                <a:spcPct val="150000"/>
+              </a:lnSpc>
+              <a:buNone/>
+            </a:pPr>
+            <a:r>
+              <a:rPr lang="en-US" dirty="0"/>
+              <a:t> T</a:t>
+            </a:r>
+            <a:r>
+              <a:rPr lang="en-US" sz="2400" dirty="0"/>
+              <a:t>hree subtests of the Clinical Evaluation of Language Fundamentals Preschool–Second Edition (CELF Preschool–2) were administered from which the Core Language score was obtained. The Core Language score is considered to be the most representative measure of Celine’s language skills and provides a reliable way to quantify a child’s overall language performance. The Core Language score has a mean of 100 and a standard deviation of 15. A score of 100 on this scale represents the performance of a typically developing child of a given age.  Celine received a Core Language score of 75 (confidence interval = 69 to 81, percentile rank = 5). This score is in the low range of developmental functioning.</a:t>
+            </a:r>
+          </a:p>
+          <a:p>
+            <a:pPr marL="0" indent="0">
+              <a:buNone/>
+            </a:pPr>
             <a:endParaRPr lang="en-US" sz="2400" dirty="0"/>
           </a:p>
           <a:p>
-            <a:r>
-              <a:rPr lang="en-US" sz="2400" dirty="0"/>
-              <a:t>Substituting a sound made in the back of the mouth (such as “g”) for a sound made in the front of the mouth (“d”), such as “</a:t>
-            </a:r>
-            <a:r>
-              <a:rPr lang="en-US" sz="2400" dirty="0" err="1"/>
-              <a:t>dum</a:t>
-            </a:r>
-            <a:r>
-              <a:rPr lang="en-US" sz="2400" dirty="0"/>
-              <a:t>” for “gum”. </a:t>
-            </a:r>
-          </a:p>
-          <a:p>
-            <a:endParaRPr lang="en-US" sz="2400" dirty="0"/>
-          </a:p>
-          <a:p>
-            <a:r>
-              <a:rPr lang="en-US" sz="2400" dirty="0"/>
-              <a:t>Is this correct?			OR			Is this correct?</a:t>
-            </a:r>
-          </a:p>
-          <a:p>
-            <a:r>
-              <a:rPr lang="en-US" sz="2400" dirty="0"/>
-              <a:t>/g/          /d/ 						/d/          /g/ </a:t>
-            </a:r>
-          </a:p>
-          <a:p>
-            <a:r>
-              <a:rPr lang="en-US" sz="2400" dirty="0"/>
-              <a:t>g/d									d/g					</a:t>
-            </a:r>
-          </a:p>
-          <a:p>
-            <a:r>
-              <a:rPr lang="en-US" sz="2400" dirty="0"/>
-              <a:t>gum/</a:t>
-            </a:r>
-            <a:r>
-              <a:rPr lang="en-US" sz="2400" dirty="0" err="1"/>
-              <a:t>dum</a:t>
-            </a:r>
-            <a:r>
-              <a:rPr lang="en-US" sz="2400" dirty="0"/>
-              <a:t>							</a:t>
-            </a:r>
-            <a:r>
-              <a:rPr lang="en-US" sz="2400" dirty="0" err="1"/>
-              <a:t>dum</a:t>
-            </a:r>
-            <a:r>
-              <a:rPr lang="en-US" sz="2400" dirty="0"/>
-              <a:t>/gum	</a:t>
-            </a:r>
-          </a:p>
-        </p:txBody>
-      </p:sp>
-      <p:sp>
-        <p:nvSpPr>
-          <p:cNvPr id="3" name="Right Arrow 2">
-            <a:extLst>
-              <a:ext uri="{FF2B5EF4-FFF2-40B4-BE49-F238E27FC236}">
-                <a16:creationId xmlns:a16="http://schemas.microsoft.com/office/drawing/2014/main" id="{F6C6654A-D41C-0D41-9C3F-2B05180801E1}"/>
-              </a:ext>
-            </a:extLst>
-          </p:cNvPr>
-          <p:cNvSpPr/>
-          <p:nvPr/>
-        </p:nvSpPr>
-        <p:spPr>
-          <a:xfrm>
-            <a:off x="2509948" y="3546373"/>
-            <a:ext cx="473685" cy="240328"/>
-          </a:xfrm>
-          <a:prstGeom prst="rightArrow">
-            <a:avLst/>
-          </a:prstGeom>
-        </p:spPr>
-        <p:style>
-          <a:lnRef idx="2">
-            <a:schemeClr val="accent1">
-              <a:shade val="50000"/>
-            </a:schemeClr>
-          </a:lnRef>
-          <a:fillRef idx="1">
-            <a:schemeClr val="accent1"/>
-          </a:fillRef>
-          <a:effectRef idx="0">
-            <a:schemeClr val="accent1"/>
-          </a:effectRef>
-          <a:fontRef idx="minor">
-            <a:schemeClr val="lt1"/>
-          </a:fontRef>
-        </p:style>
-        <p:txBody>
-          <a:bodyPr rtlCol="0" anchor="ctr"/>
-          <a:lstStyle/>
-          <a:p>
-            <a:pPr algn="ctr"/>
-            <a:endParaRPr lang="en-US"/>
-          </a:p>
-        </p:txBody>
-      </p:sp>
-      <p:sp>
-        <p:nvSpPr>
-          <p:cNvPr id="5" name="Right Arrow 4">
-            <a:extLst>
-              <a:ext uri="{FF2B5EF4-FFF2-40B4-BE49-F238E27FC236}">
-                <a16:creationId xmlns:a16="http://schemas.microsoft.com/office/drawing/2014/main" id="{AA8A5EEE-DB2A-7440-AFD0-B4764A3B5995}"/>
-              </a:ext>
-            </a:extLst>
-          </p:cNvPr>
-          <p:cNvSpPr/>
-          <p:nvPr/>
-        </p:nvSpPr>
-        <p:spPr>
-          <a:xfrm>
-            <a:off x="6661592" y="3546373"/>
-            <a:ext cx="473685" cy="240328"/>
-          </a:xfrm>
-          <a:prstGeom prst="rightArrow">
-            <a:avLst/>
-          </a:prstGeom>
-        </p:spPr>
-        <p:style>
-          <a:lnRef idx="2">
-            <a:schemeClr val="accent1">
-              <a:shade val="50000"/>
-            </a:schemeClr>
-          </a:lnRef>
-          <a:fillRef idx="1">
-            <a:schemeClr val="accent1"/>
-          </a:fillRef>
-          <a:effectRef idx="0">
-            <a:schemeClr val="accent1"/>
-          </a:effectRef>
-          <a:fontRef idx="minor">
-            <a:schemeClr val="lt1"/>
-          </a:fontRef>
-        </p:style>
-        <p:txBody>
-          <a:bodyPr rtlCol="0" anchor="ctr"/>
-          <a:lstStyle/>
-          <a:p>
-            <a:pPr algn="ctr"/>
-            <a:endParaRPr lang="en-US"/>
+            <a:endParaRPr lang="en-US" dirty="0"/>
           </a:p>
         </p:txBody>
       </p:sp>
     </p:spTree>
     <p:extLst>
       <p:ext uri="{BB962C8B-B14F-4D97-AF65-F5344CB8AC3E}">
-        <p14:creationId xmlns:p14="http://schemas.microsoft.com/office/powerpoint/2010/main" val="1260996193"/>
+        <p14:creationId xmlns:p14="http://schemas.microsoft.com/office/powerpoint/2010/main" val="1880759927"/>
       </p:ext>
     </p:extLst>
   </p:cSld>
@@ -6402,124 +6054,6 @@
       </p:grpSpPr>
       <p:sp>
         <p:nvSpPr>
-          <p:cNvPr id="2" name="Title 1">
-            <a:extLst>
-              <a:ext uri="{FF2B5EF4-FFF2-40B4-BE49-F238E27FC236}">
-                <a16:creationId xmlns:a16="http://schemas.microsoft.com/office/drawing/2014/main" id="{BEACB89E-6F4F-4E40-8183-5CB4DA7D4021}"/>
-              </a:ext>
-            </a:extLst>
-          </p:cNvPr>
-          <p:cNvSpPr>
-            <a:spLocks noGrp="1"/>
-          </p:cNvSpPr>
-          <p:nvPr>
-            <p:ph type="title"/>
-          </p:nvPr>
-        </p:nvSpPr>
-        <p:spPr>
-          <a:xfrm>
-            <a:off x="2198948" y="203082"/>
-            <a:ext cx="7886700" cy="893658"/>
-          </a:xfrm>
-        </p:spPr>
-        <p:txBody>
-          <a:bodyPr/>
-          <a:lstStyle/>
-          <a:p>
-            <a:pPr algn="ctr"/>
-            <a:r>
-              <a:rPr lang="en-US" dirty="0"/>
-              <a:t>Describing Test Scores in Reports</a:t>
-            </a:r>
-          </a:p>
-        </p:txBody>
-      </p:sp>
-      <p:sp>
-        <p:nvSpPr>
-          <p:cNvPr id="3" name="Content Placeholder 2">
-            <a:extLst>
-              <a:ext uri="{FF2B5EF4-FFF2-40B4-BE49-F238E27FC236}">
-                <a16:creationId xmlns:a16="http://schemas.microsoft.com/office/drawing/2014/main" id="{9D1FBA8D-09E9-F04B-8EC3-6B83590F1E66}"/>
-              </a:ext>
-            </a:extLst>
-          </p:cNvPr>
-          <p:cNvSpPr>
-            <a:spLocks noGrp="1"/>
-          </p:cNvSpPr>
-          <p:nvPr>
-            <p:ph idx="1"/>
-          </p:nvPr>
-        </p:nvSpPr>
-        <p:spPr>
-          <a:xfrm>
-            <a:off x="1720770" y="992567"/>
-            <a:ext cx="8843057" cy="5462649"/>
-          </a:xfrm>
-        </p:spPr>
-        <p:txBody>
-          <a:bodyPr>
-            <a:normAutofit fontScale="92500"/>
-          </a:bodyPr>
-          <a:lstStyle/>
-          <a:p>
-            <a:pPr marL="0" indent="0">
-              <a:lnSpc>
-                <a:spcPct val="150000"/>
-              </a:lnSpc>
-              <a:buNone/>
-            </a:pPr>
-            <a:r>
-              <a:rPr lang="en-US" dirty="0"/>
-              <a:t> T</a:t>
-            </a:r>
-            <a:r>
-              <a:rPr lang="en-US" sz="2400" dirty="0"/>
-              <a:t>hree subtests of the Clinical Evaluation of Language Fundamentals Preschool–Second Edition (CELF Preschool–2) were administered from which the Core Language score was obtained. The Core Language score is considered to be the most representative measure of Celine’s language skills and provides a reliable way to quantify a child’s overall language performance. The Core Language score has a mean of 100 and a standard deviation of 15. A score of 100 on this scale represents the performance of a typically developing child of a given age.  Celine received a Core Language score of 75 (confidence interval = 69 to 81, percentile rank = 5). This score is in the low range of developmental functioning.</a:t>
-            </a:r>
-          </a:p>
-          <a:p>
-            <a:pPr marL="0" indent="0">
-              <a:buNone/>
-            </a:pPr>
-            <a:endParaRPr lang="en-US" sz="2400" dirty="0"/>
-          </a:p>
-          <a:p>
-            <a:endParaRPr lang="en-US" dirty="0"/>
-          </a:p>
-        </p:txBody>
-      </p:sp>
-    </p:spTree>
-    <p:extLst>
-      <p:ext uri="{BB962C8B-B14F-4D97-AF65-F5344CB8AC3E}">
-        <p14:creationId xmlns:p14="http://schemas.microsoft.com/office/powerpoint/2010/main" val="1880759927"/>
-      </p:ext>
-    </p:extLst>
-  </p:cSld>
-  <p:clrMapOvr>
-    <a:masterClrMapping/>
-  </p:clrMapOvr>
-</p:sld>
-</file>
-
-<file path=ppt/slides/slide5.xml><?xml version="1.0" encoding="utf-8"?>
-<p:sld xmlns:a="http://schemas.openxmlformats.org/drawingml/2006/main" xmlns:r="http://schemas.openxmlformats.org/officeDocument/2006/relationships" xmlns:p="http://schemas.openxmlformats.org/presentationml/2006/main">
-  <p:cSld>
-    <p:spTree>
-      <p:nvGrpSpPr>
-        <p:cNvPr id="1" name=""/>
-        <p:cNvGrpSpPr/>
-        <p:nvPr/>
-      </p:nvGrpSpPr>
-      <p:grpSpPr>
-        <a:xfrm>
-          <a:off x="0" y="0"/>
-          <a:ext cx="0" cy="0"/>
-          <a:chOff x="0" y="0"/>
-          <a:chExt cx="0" cy="0"/>
-        </a:xfrm>
-      </p:grpSpPr>
-      <p:sp>
-        <p:nvSpPr>
           <p:cNvPr id="2" name="Rectangle 1">
             <a:extLst>
               <a:ext uri="{FF2B5EF4-FFF2-40B4-BE49-F238E27FC236}">
@@ -6571,6 +6105,45 @@
               <a:latin typeface="Times New Roman" panose="02020603050405020304" pitchFamily="18" charset="0"/>
               <a:ea typeface="Times New Roman" panose="02020603050405020304" pitchFamily="18" charset="0"/>
             </a:endParaRPr>
+          </a:p>
+        </p:txBody>
+      </p:sp>
+      <p:sp>
+        <p:nvSpPr>
+          <p:cNvPr id="3" name="TextBox 2">
+            <a:extLst>
+              <a:ext uri="{FF2B5EF4-FFF2-40B4-BE49-F238E27FC236}">
+                <a16:creationId xmlns:a16="http://schemas.microsoft.com/office/drawing/2014/main" id="{8B72D5CE-0588-8EA5-54B9-D33400A3AA9F}"/>
+              </a:ext>
+            </a:extLst>
+          </p:cNvPr>
+          <p:cNvSpPr txBox="1"/>
+          <p:nvPr/>
+        </p:nvSpPr>
+        <p:spPr>
+          <a:xfrm>
+            <a:off x="10903528" y="2749183"/>
+            <a:ext cx="1177636" cy="2308324"/>
+          </a:xfrm>
+          <a:prstGeom prst="rect">
+            <a:avLst/>
+          </a:prstGeom>
+          <a:noFill/>
+        </p:spPr>
+        <p:txBody>
+          <a:bodyPr wrap="square" rtlCol="0">
+            <a:spAutoFit/>
+          </a:bodyPr>
+          <a:lstStyle/>
+          <a:p>
+            <a:r>
+              <a:rPr lang="en-US" dirty="0">
+                <a:solidFill>
+                  <a:srgbClr val="FF0000"/>
+                </a:solidFill>
+              </a:rPr>
+              <a:t>Often your clinical setting will dictate report style</a:t>
+            </a:r>
           </a:p>
         </p:txBody>
       </p:sp>
@@ -6587,7 +6160,7 @@
 </p:sld>
 </file>
 
-<file path=ppt/slides/slide6.xml><?xml version="1.0" encoding="utf-8"?>
+<file path=ppt/slides/slide5.xml><?xml version="1.0" encoding="utf-8"?>
 <p:sld xmlns:a="http://schemas.openxmlformats.org/drawingml/2006/main" xmlns:r="http://schemas.openxmlformats.org/officeDocument/2006/relationships" xmlns:p="http://schemas.openxmlformats.org/presentationml/2006/main">
   <p:cSld>
     <p:spTree>
@@ -7970,7 +7543,7 @@
 </p:sld>
 </file>
 
-<file path=ppt/slides/slide7.xml><?xml version="1.0" encoding="utf-8"?>
+<file path=ppt/slides/slide6.xml><?xml version="1.0" encoding="utf-8"?>
 <p:sld xmlns:a="http://schemas.openxmlformats.org/drawingml/2006/main" xmlns:r="http://schemas.openxmlformats.org/officeDocument/2006/relationships" xmlns:p="http://schemas.openxmlformats.org/presentationml/2006/main">
   <p:cSld>
     <p:spTree>
@@ -8909,7 +8482,7 @@
 </p:sld>
 </file>
 
-<file path=ppt/slides/slide8.xml><?xml version="1.0" encoding="utf-8"?>
+<file path=ppt/slides/slide7.xml><?xml version="1.0" encoding="utf-8"?>
 <p:sld xmlns:a="http://schemas.openxmlformats.org/drawingml/2006/main" xmlns:r="http://schemas.openxmlformats.org/officeDocument/2006/relationships" xmlns:p="http://schemas.openxmlformats.org/presentationml/2006/main">
   <p:cSld>
     <p:spTree>
@@ -9000,6 +8573,45 @@
           </a:p>
         </p:txBody>
       </p:sp>
+      <p:sp>
+        <p:nvSpPr>
+          <p:cNvPr id="3" name="TextBox 2">
+            <a:extLst>
+              <a:ext uri="{FF2B5EF4-FFF2-40B4-BE49-F238E27FC236}">
+                <a16:creationId xmlns:a16="http://schemas.microsoft.com/office/drawing/2014/main" id="{E5B63A64-2CAA-67BD-A9DA-8990A5CED8D7}"/>
+              </a:ext>
+            </a:extLst>
+          </p:cNvPr>
+          <p:cNvSpPr txBox="1"/>
+          <p:nvPr/>
+        </p:nvSpPr>
+        <p:spPr>
+          <a:xfrm>
+            <a:off x="10432474" y="1036850"/>
+            <a:ext cx="1537854" cy="3693319"/>
+          </a:xfrm>
+          <a:prstGeom prst="rect">
+            <a:avLst/>
+          </a:prstGeom>
+          <a:noFill/>
+        </p:spPr>
+        <p:txBody>
+          <a:bodyPr wrap="square" rtlCol="0">
+            <a:spAutoFit/>
+          </a:bodyPr>
+          <a:lstStyle/>
+          <a:p>
+            <a:r>
+              <a:rPr lang="en-US" dirty="0">
+                <a:solidFill>
+                  <a:srgbClr val="FF0000"/>
+                </a:solidFill>
+              </a:rPr>
+              <a:t>Want to write defensively and justifiably to make your clinical decision – whether to support eligibility for services or to not suggest services are warranted</a:t>
+            </a:r>
+          </a:p>
+        </p:txBody>
+      </p:sp>
     </p:spTree>
     <p:extLst>
       <p:ext uri="{BB962C8B-B14F-4D97-AF65-F5344CB8AC3E}">
@@ -9013,7 +8625,7 @@
 </p:sld>
 </file>
 
-<file path=ppt/slides/slide9.xml><?xml version="1.0" encoding="utf-8"?>
+<file path=ppt/slides/slide8.xml><?xml version="1.0" encoding="utf-8"?>
 <p:sld xmlns:a="http://schemas.openxmlformats.org/drawingml/2006/main" xmlns:r="http://schemas.openxmlformats.org/officeDocument/2006/relationships" xmlns:p="http://schemas.openxmlformats.org/presentationml/2006/main">
   <p:cSld>
     <p:spTree>
@@ -9891,6 +9503,245 @@
     <p:extLst>
       <p:ext uri="{BB962C8B-B14F-4D97-AF65-F5344CB8AC3E}">
         <p14:creationId xmlns:p14="http://schemas.microsoft.com/office/powerpoint/2010/main" val="1482659541"/>
+      </p:ext>
+    </p:extLst>
+  </p:cSld>
+  <p:clrMapOvr>
+    <a:masterClrMapping/>
+  </p:clrMapOvr>
+</p:sld>
+</file>
+
+<file path=ppt/slides/slide9.xml><?xml version="1.0" encoding="utf-8"?>
+<p:sld xmlns:a="http://schemas.openxmlformats.org/drawingml/2006/main" xmlns:r="http://schemas.openxmlformats.org/officeDocument/2006/relationships" xmlns:p="http://schemas.openxmlformats.org/presentationml/2006/main">
+  <p:cSld>
+    <p:spTree>
+      <p:nvGrpSpPr>
+        <p:cNvPr id="1" name=""/>
+        <p:cNvGrpSpPr/>
+        <p:nvPr/>
+      </p:nvGrpSpPr>
+      <p:grpSpPr>
+        <a:xfrm>
+          <a:off x="0" y="0"/>
+          <a:ext cx="0" cy="0"/>
+          <a:chOff x="0" y="0"/>
+          <a:chExt cx="0" cy="0"/>
+        </a:xfrm>
+      </p:grpSpPr>
+      <p:sp>
+        <p:nvSpPr>
+          <p:cNvPr id="2" name="TextBox 1">
+            <a:extLst>
+              <a:ext uri="{FF2B5EF4-FFF2-40B4-BE49-F238E27FC236}">
+                <a16:creationId xmlns:a16="http://schemas.microsoft.com/office/drawing/2014/main" id="{C2297DF4-7BF5-DD47-9935-E35747C8F551}"/>
+              </a:ext>
+            </a:extLst>
+          </p:cNvPr>
+          <p:cNvSpPr txBox="1"/>
+          <p:nvPr/>
+        </p:nvSpPr>
+        <p:spPr>
+          <a:xfrm>
+            <a:off x="2007327" y="457200"/>
+            <a:ext cx="8028160" cy="1200329"/>
+          </a:xfrm>
+          <a:prstGeom prst="rect">
+            <a:avLst/>
+          </a:prstGeom>
+          <a:noFill/>
+        </p:spPr>
+        <p:txBody>
+          <a:bodyPr wrap="none" rtlCol="0">
+            <a:spAutoFit/>
+          </a:bodyPr>
+          <a:lstStyle/>
+          <a:p>
+            <a:r>
+              <a:rPr lang="en-US" sz="3600" b="1" spc="300" dirty="0">
+                <a:latin typeface="Gabriola" pitchFamily="82" charset="0"/>
+              </a:rPr>
+              <a:t>Interpreting Results to Families and Clients</a:t>
+            </a:r>
+          </a:p>
+          <a:p>
+            <a:pPr algn="ctr"/>
+            <a:r>
+              <a:rPr lang="en-US" sz="3600" b="1" spc="300" dirty="0">
+                <a:latin typeface="Gabriola" pitchFamily="82" charset="0"/>
+              </a:rPr>
+              <a:t>Speaking with Empathy</a:t>
+            </a:r>
+          </a:p>
+        </p:txBody>
+      </p:sp>
+      <p:sp>
+        <p:nvSpPr>
+          <p:cNvPr id="4" name="TextBox 3">
+            <a:extLst>
+              <a:ext uri="{FF2B5EF4-FFF2-40B4-BE49-F238E27FC236}">
+                <a16:creationId xmlns:a16="http://schemas.microsoft.com/office/drawing/2014/main" id="{FBE7F8A3-525F-AF49-A4F4-2309B85AE35E}"/>
+              </a:ext>
+            </a:extLst>
+          </p:cNvPr>
+          <p:cNvSpPr txBox="1"/>
+          <p:nvPr/>
+        </p:nvSpPr>
+        <p:spPr>
+          <a:xfrm>
+            <a:off x="2007328" y="1657529"/>
+            <a:ext cx="8223351" cy="2246769"/>
+          </a:xfrm>
+          <a:prstGeom prst="rect">
+            <a:avLst/>
+          </a:prstGeom>
+          <a:noFill/>
+        </p:spPr>
+        <p:txBody>
+          <a:bodyPr wrap="square" rtlCol="0">
+            <a:spAutoFit/>
+          </a:bodyPr>
+          <a:lstStyle/>
+          <a:p>
+            <a:pPr marL="457200" indent="-457200">
+              <a:buFont typeface="Arial" panose="020B0604020202020204" pitchFamily="34" charset="0"/>
+              <a:buChar char="•"/>
+            </a:pPr>
+            <a:r>
+              <a:rPr lang="en-US" sz="2800" dirty="0">
+                <a:latin typeface="Gabriola" pitchFamily="82" charset="0"/>
+              </a:rPr>
+              <a:t>Consider the family’s or client’s:</a:t>
+            </a:r>
+          </a:p>
+          <a:p>
+            <a:pPr marL="914400" lvl="1" indent="-457200">
+              <a:buFont typeface="Arial" panose="020B0604020202020204" pitchFamily="34" charset="0"/>
+              <a:buChar char="•"/>
+            </a:pPr>
+            <a:r>
+              <a:rPr lang="en-US" sz="2800" dirty="0">
+                <a:latin typeface="Gabriola" pitchFamily="82" charset="0"/>
+              </a:rPr>
+              <a:t>reason for seeking an assessment</a:t>
+            </a:r>
+          </a:p>
+          <a:p>
+            <a:pPr marL="914400" lvl="1" indent="-457200">
+              <a:buFont typeface="Arial" panose="020B0604020202020204" pitchFamily="34" charset="0"/>
+              <a:buChar char="•"/>
+            </a:pPr>
+            <a:r>
+              <a:rPr lang="en-US" sz="2800" dirty="0">
+                <a:latin typeface="Gabriola" pitchFamily="82" charset="0"/>
+              </a:rPr>
+              <a:t>current situation in life</a:t>
+            </a:r>
+          </a:p>
+          <a:p>
+            <a:pPr marL="914400" lvl="1" indent="-457200">
+              <a:buFont typeface="Arial" panose="020B0604020202020204" pitchFamily="34" charset="0"/>
+              <a:buChar char="•"/>
+            </a:pPr>
+            <a:r>
+              <a:rPr lang="en-US" sz="2800" dirty="0">
+                <a:latin typeface="Gabriola" pitchFamily="82" charset="0"/>
+              </a:rPr>
+              <a:t>parenting philosophy/skills and/or stage of  life &amp; personal goals</a:t>
+            </a:r>
+          </a:p>
+          <a:p>
+            <a:pPr marL="914400" lvl="1" indent="-457200">
+              <a:buFont typeface="Arial" panose="020B0604020202020204" pitchFamily="34" charset="0"/>
+              <a:buChar char="•"/>
+            </a:pPr>
+            <a:r>
+              <a:rPr lang="en-US" sz="2800" dirty="0">
+                <a:latin typeface="Gabriola" pitchFamily="82" charset="0"/>
+              </a:rPr>
+              <a:t>understanding of the possible </a:t>
+            </a:r>
+            <a:r>
+              <a:rPr lang="en-US" sz="2800" b="1" dirty="0">
+                <a:latin typeface="Gabriola" pitchFamily="82" charset="0"/>
+              </a:rPr>
+              <a:t>diagnosis.</a:t>
+            </a:r>
+          </a:p>
+        </p:txBody>
+      </p:sp>
+      <p:sp>
+        <p:nvSpPr>
+          <p:cNvPr id="5" name="TextBox 4">
+            <a:extLst>
+              <a:ext uri="{FF2B5EF4-FFF2-40B4-BE49-F238E27FC236}">
+                <a16:creationId xmlns:a16="http://schemas.microsoft.com/office/drawing/2014/main" id="{F76BF309-EFB0-3044-9438-9BF9BF55578B}"/>
+              </a:ext>
+            </a:extLst>
+          </p:cNvPr>
+          <p:cNvSpPr txBox="1"/>
+          <p:nvPr/>
+        </p:nvSpPr>
+        <p:spPr>
+          <a:xfrm>
+            <a:off x="2007327" y="4088964"/>
+            <a:ext cx="7825786" cy="2554545"/>
+          </a:xfrm>
+          <a:prstGeom prst="rect">
+            <a:avLst/>
+          </a:prstGeom>
+          <a:noFill/>
+        </p:spPr>
+        <p:txBody>
+          <a:bodyPr wrap="square" rtlCol="0">
+            <a:spAutoFit/>
+          </a:bodyPr>
+          <a:lstStyle/>
+          <a:p>
+            <a:r>
+              <a:rPr lang="en-US" sz="2000" dirty="0"/>
+              <a:t>From </a:t>
+            </a:r>
+            <a:r>
+              <a:rPr lang="en-US" sz="2000" i="1" dirty="0"/>
+              <a:t>Autism in Heels </a:t>
+            </a:r>
+            <a:r>
+              <a:rPr lang="en-US" sz="2000" dirty="0"/>
+              <a:t>(2018)  a memoir by Jennifer Cook O’Toole</a:t>
+            </a:r>
+          </a:p>
+          <a:p>
+            <a:endParaRPr lang="en-US" sz="2000" dirty="0"/>
+          </a:p>
+          <a:p>
+            <a:r>
+              <a:rPr lang="en-US" sz="2000" dirty="0"/>
+              <a:t>“After all, no matter what follows, the very word </a:t>
+            </a:r>
+            <a:r>
+              <a:rPr lang="en-US" sz="2000" i="1" dirty="0"/>
+              <a:t>diagnosis </a:t>
+            </a:r>
+            <a:r>
+              <a:rPr lang="en-US" sz="2000" dirty="0"/>
+              <a:t>is scary.  No one diagnoses happiness.  You don’t go to a doctor to joyously find out whether you will be diagnosed with pregnancy.  On the contrary, diagnosis goes hand in hand with life’s deepest hurts.  Diagnosis is what I heard before the words </a:t>
+            </a:r>
+            <a:r>
+              <a:rPr lang="en-US" sz="2000" i="1" dirty="0"/>
+              <a:t>terminal lung cancer </a:t>
+            </a:r>
+            <a:r>
+              <a:rPr lang="en-US" sz="2000" dirty="0"/>
+              <a:t> and my dad’s name were mentioned in the same sentence.</a:t>
+            </a:r>
+          </a:p>
+        </p:txBody>
+      </p:sp>
+    </p:spTree>
+    <p:extLst>
+      <p:ext uri="{BB962C8B-B14F-4D97-AF65-F5344CB8AC3E}">
+        <p14:creationId xmlns:p14="http://schemas.microsoft.com/office/powerpoint/2010/main" val="2301073165"/>
       </p:ext>
     </p:extLst>
   </p:cSld>

</xml_diff>

<commit_message>
week 5 slides finalized
</commit_message>
<xml_diff>
--- a/slides/cds431_week4_1.pptx
+++ b/slides/cds431_week4_1.pptx
@@ -210,7 +210,7 @@
           <a:p>
             <a:fld id="{7BD42D89-64F2-5E44-998D-54AF6D40E4AE}" type="datetimeFigureOut">
               <a:rPr lang="en-US" smtClean="0"/>
-              <a:t>4/14/22</a:t>
+              <a:t>4/21/22</a:t>
             </a:fld>
             <a:endParaRPr lang="en-US"/>
           </a:p>
@@ -1587,7 +1587,7 @@
           <a:p>
             <a:fld id="{86ED8F93-1253-CC46-BD23-6B16D47EB250}" type="datetimeFigureOut">
               <a:rPr lang="en-US" smtClean="0"/>
-              <a:t>4/14/22</a:t>
+              <a:t>4/21/22</a:t>
             </a:fld>
             <a:endParaRPr lang="en-US"/>
           </a:p>
@@ -1785,7 +1785,7 @@
           <a:p>
             <a:fld id="{86ED8F93-1253-CC46-BD23-6B16D47EB250}" type="datetimeFigureOut">
               <a:rPr lang="en-US" smtClean="0"/>
-              <a:t>4/14/22</a:t>
+              <a:t>4/21/22</a:t>
             </a:fld>
             <a:endParaRPr lang="en-US"/>
           </a:p>
@@ -1993,7 +1993,7 @@
           <a:p>
             <a:fld id="{86ED8F93-1253-CC46-BD23-6B16D47EB250}" type="datetimeFigureOut">
               <a:rPr lang="en-US" smtClean="0"/>
-              <a:t>4/14/22</a:t>
+              <a:t>4/21/22</a:t>
             </a:fld>
             <a:endParaRPr lang="en-US"/>
           </a:p>
@@ -2191,7 +2191,7 @@
           <a:p>
             <a:fld id="{86ED8F93-1253-CC46-BD23-6B16D47EB250}" type="datetimeFigureOut">
               <a:rPr lang="en-US" smtClean="0"/>
-              <a:t>4/14/22</a:t>
+              <a:t>4/21/22</a:t>
             </a:fld>
             <a:endParaRPr lang="en-US"/>
           </a:p>
@@ -2466,7 +2466,7 @@
           <a:p>
             <a:fld id="{86ED8F93-1253-CC46-BD23-6B16D47EB250}" type="datetimeFigureOut">
               <a:rPr lang="en-US" smtClean="0"/>
-              <a:t>4/14/22</a:t>
+              <a:t>4/21/22</a:t>
             </a:fld>
             <a:endParaRPr lang="en-US"/>
           </a:p>
@@ -2731,7 +2731,7 @@
           <a:p>
             <a:fld id="{86ED8F93-1253-CC46-BD23-6B16D47EB250}" type="datetimeFigureOut">
               <a:rPr lang="en-US" smtClean="0"/>
-              <a:t>4/14/22</a:t>
+              <a:t>4/21/22</a:t>
             </a:fld>
             <a:endParaRPr lang="en-US"/>
           </a:p>
@@ -3143,7 +3143,7 @@
           <a:p>
             <a:fld id="{86ED8F93-1253-CC46-BD23-6B16D47EB250}" type="datetimeFigureOut">
               <a:rPr lang="en-US" smtClean="0"/>
-              <a:t>4/14/22</a:t>
+              <a:t>4/21/22</a:t>
             </a:fld>
             <a:endParaRPr lang="en-US"/>
           </a:p>
@@ -3284,7 +3284,7 @@
           <a:p>
             <a:fld id="{86ED8F93-1253-CC46-BD23-6B16D47EB250}" type="datetimeFigureOut">
               <a:rPr lang="en-US" smtClean="0"/>
-              <a:t>4/14/22</a:t>
+              <a:t>4/21/22</a:t>
             </a:fld>
             <a:endParaRPr lang="en-US"/>
           </a:p>
@@ -3397,7 +3397,7 @@
           <a:p>
             <a:fld id="{86ED8F93-1253-CC46-BD23-6B16D47EB250}" type="datetimeFigureOut">
               <a:rPr lang="en-US" smtClean="0"/>
-              <a:t>4/14/22</a:t>
+              <a:t>4/21/22</a:t>
             </a:fld>
             <a:endParaRPr lang="en-US"/>
           </a:p>
@@ -3708,7 +3708,7 @@
           <a:p>
             <a:fld id="{86ED8F93-1253-CC46-BD23-6B16D47EB250}" type="datetimeFigureOut">
               <a:rPr lang="en-US" smtClean="0"/>
-              <a:t>4/14/22</a:t>
+              <a:t>4/21/22</a:t>
             </a:fld>
             <a:endParaRPr lang="en-US"/>
           </a:p>
@@ -3996,7 +3996,7 @@
           <a:p>
             <a:fld id="{86ED8F93-1253-CC46-BD23-6B16D47EB250}" type="datetimeFigureOut">
               <a:rPr lang="en-US" smtClean="0"/>
-              <a:t>4/14/22</a:t>
+              <a:t>4/21/22</a:t>
             </a:fld>
             <a:endParaRPr lang="en-US"/>
           </a:p>
@@ -4267,7 +4267,7 @@
           <a:p>
             <a:fld id="{86ED8F93-1253-CC46-BD23-6B16D47EB250}" type="datetimeFigureOut">
               <a:rPr lang="en-US" smtClean="0"/>
-              <a:t>4/14/22</a:t>
+              <a:t>4/21/22</a:t>
             </a:fld>
             <a:endParaRPr lang="en-US"/>
           </a:p>

</xml_diff>